<commit_message>
updated readme added images for tutorial and added images for samples
</commit_message>
<xml_diff>
--- a/Git Part II.pptx
+++ b/Git Part II.pptx
@@ -111,6 +111,11 @@
       </a:defRPr>
     </a:lvl9pPr>
   </p:defaultTextStyle>
+  <p:extLst>
+    <p:ext uri="{EFAFB233-063F-42B5-8137-9DF3F51BA10A}">
+      <p15:sldGuideLst xmlns:p15="http://schemas.microsoft.com/office/powerpoint/2012/main"/>
+    </p:ext>
+  </p:extLst>
 </p:presentation>
 </file>
 
@@ -196,7 +201,7 @@
           <a:p>
             <a:fld id="{221B63A5-15A0-45A4-B4A3-191F96F94C08}" type="datetimeFigureOut">
               <a:rPr lang="en-US" smtClean="0"/>
-              <a:t>2/17/2020</a:t>
+              <a:t>2/18/2020</a:t>
             </a:fld>
             <a:endParaRPr lang="en-US"/>
           </a:p>
@@ -606,7 +611,35 @@
           <a:bodyPr/>
           <a:lstStyle/>
           <a:p>
+            <a:r>
+              <a:rPr lang="en-US" dirty="0"/>
+              <a:t>Show Forks on </a:t>
+            </a:r>
+            <a:r>
+              <a:rPr lang="en-US" dirty="0" err="1"/>
+              <a:t>Github</a:t>
+            </a:r>
             <a:endParaRPr lang="en-US" dirty="0"/>
+          </a:p>
+          <a:p>
+            <a:r>
+              <a:rPr lang="en-US" dirty="0"/>
+              <a:t>Show </a:t>
+            </a:r>
+            <a:r>
+              <a:rPr lang="en-US" dirty="0" err="1"/>
+              <a:t>Github</a:t>
+            </a:r>
+            <a:r>
+              <a:rPr lang="en-US" dirty="0"/>
+              <a:t> Pages</a:t>
+            </a:r>
+          </a:p>
+          <a:p>
+            <a:r>
+              <a:rPr lang="en-US" dirty="0"/>
+              <a:t>Show rtpsug.com vs rtpsugmembers.github.io</a:t>
+            </a:r>
           </a:p>
         </p:txBody>
       </p:sp>
@@ -793,7 +826,7 @@
           <a:p>
             <a:fld id="{1B9EC125-DECF-46F7-929E-FE049A5B98E1}" type="datetimeFigureOut">
               <a:rPr lang="en-US" smtClean="0"/>
-              <a:t>2/17/2020</a:t>
+              <a:t>2/18/2020</a:t>
             </a:fld>
             <a:endParaRPr lang="en-US"/>
           </a:p>
@@ -991,7 +1024,7 @@
           <a:p>
             <a:fld id="{1B9EC125-DECF-46F7-929E-FE049A5B98E1}" type="datetimeFigureOut">
               <a:rPr lang="en-US" smtClean="0"/>
-              <a:t>2/17/2020</a:t>
+              <a:t>2/18/2020</a:t>
             </a:fld>
             <a:endParaRPr lang="en-US"/>
           </a:p>
@@ -1199,7 +1232,7 @@
           <a:p>
             <a:fld id="{1B9EC125-DECF-46F7-929E-FE049A5B98E1}" type="datetimeFigureOut">
               <a:rPr lang="en-US" smtClean="0"/>
-              <a:t>2/17/2020</a:t>
+              <a:t>2/18/2020</a:t>
             </a:fld>
             <a:endParaRPr lang="en-US"/>
           </a:p>
@@ -1397,7 +1430,7 @@
           <a:p>
             <a:fld id="{1B9EC125-DECF-46F7-929E-FE049A5B98E1}" type="datetimeFigureOut">
               <a:rPr lang="en-US" smtClean="0"/>
-              <a:t>2/17/2020</a:t>
+              <a:t>2/18/2020</a:t>
             </a:fld>
             <a:endParaRPr lang="en-US"/>
           </a:p>
@@ -1672,7 +1705,7 @@
           <a:p>
             <a:fld id="{1B9EC125-DECF-46F7-929E-FE049A5B98E1}" type="datetimeFigureOut">
               <a:rPr lang="en-US" smtClean="0"/>
-              <a:t>2/17/2020</a:t>
+              <a:t>2/18/2020</a:t>
             </a:fld>
             <a:endParaRPr lang="en-US"/>
           </a:p>
@@ -1937,7 +1970,7 @@
           <a:p>
             <a:fld id="{1B9EC125-DECF-46F7-929E-FE049A5B98E1}" type="datetimeFigureOut">
               <a:rPr lang="en-US" smtClean="0"/>
-              <a:t>2/17/2020</a:t>
+              <a:t>2/18/2020</a:t>
             </a:fld>
             <a:endParaRPr lang="en-US"/>
           </a:p>
@@ -2349,7 +2382,7 @@
           <a:p>
             <a:fld id="{1B9EC125-DECF-46F7-929E-FE049A5B98E1}" type="datetimeFigureOut">
               <a:rPr lang="en-US" smtClean="0"/>
-              <a:t>2/17/2020</a:t>
+              <a:t>2/18/2020</a:t>
             </a:fld>
             <a:endParaRPr lang="en-US"/>
           </a:p>
@@ -2490,7 +2523,7 @@
           <a:p>
             <a:fld id="{1B9EC125-DECF-46F7-929E-FE049A5B98E1}" type="datetimeFigureOut">
               <a:rPr lang="en-US" smtClean="0"/>
-              <a:t>2/17/2020</a:t>
+              <a:t>2/18/2020</a:t>
             </a:fld>
             <a:endParaRPr lang="en-US"/>
           </a:p>
@@ -2603,7 +2636,7 @@
           <a:p>
             <a:fld id="{1B9EC125-DECF-46F7-929E-FE049A5B98E1}" type="datetimeFigureOut">
               <a:rPr lang="en-US" smtClean="0"/>
-              <a:t>2/17/2020</a:t>
+              <a:t>2/18/2020</a:t>
             </a:fld>
             <a:endParaRPr lang="en-US"/>
           </a:p>
@@ -2914,7 +2947,7 @@
           <a:p>
             <a:fld id="{1B9EC125-DECF-46F7-929E-FE049A5B98E1}" type="datetimeFigureOut">
               <a:rPr lang="en-US" smtClean="0"/>
-              <a:t>2/17/2020</a:t>
+              <a:t>2/18/2020</a:t>
             </a:fld>
             <a:endParaRPr lang="en-US"/>
           </a:p>
@@ -3202,7 +3235,7 @@
           <a:p>
             <a:fld id="{1B9EC125-DECF-46F7-929E-FE049A5B98E1}" type="datetimeFigureOut">
               <a:rPr lang="en-US" smtClean="0"/>
-              <a:t>2/17/2020</a:t>
+              <a:t>2/18/2020</a:t>
             </a:fld>
             <a:endParaRPr lang="en-US"/>
           </a:p>
@@ -3443,7 +3476,7 @@
           <a:p>
             <a:fld id="{1B9EC125-DECF-46F7-929E-FE049A5B98E1}" type="datetimeFigureOut">
               <a:rPr lang="en-US" smtClean="0"/>
-              <a:t>2/17/2020</a:t>
+              <a:t>2/18/2020</a:t>
             </a:fld>
             <a:endParaRPr lang="en-US"/>
           </a:p>
@@ -3960,13 +3993,13 @@
   <p:clrMapOvr>
     <a:masterClrMapping/>
   </p:clrMapOvr>
-  <mc:AlternateContent xmlns:mc="http://schemas.openxmlformats.org/markup-compatibility/2006">
-    <mc:Choice xmlns:p14="http://schemas.microsoft.com/office/powerpoint/2010/main" Requires="p14">
+  <mc:AlternateContent xmlns:mc="http://schemas.openxmlformats.org/markup-compatibility/2006" xmlns:p14="http://schemas.microsoft.com/office/powerpoint/2010/main">
+    <mc:Choice Requires="p14">
       <p:transition spd="slow" p14:dur="3400">
         <p14:reveal/>
       </p:transition>
     </mc:Choice>
-    <mc:Fallback>
+    <mc:Fallback xmlns="">
       <p:transition spd="slow">
         <p:fade/>
       </p:transition>
@@ -4208,13 +4241,13 @@
   <p:clrMapOvr>
     <a:masterClrMapping/>
   </p:clrMapOvr>
-  <mc:AlternateContent xmlns:mc="http://schemas.openxmlformats.org/markup-compatibility/2006">
-    <mc:Choice xmlns:p14="http://schemas.microsoft.com/office/powerpoint/2010/main" Requires="p14">
+  <mc:AlternateContent xmlns:mc="http://schemas.openxmlformats.org/markup-compatibility/2006" xmlns:p14="http://schemas.microsoft.com/office/powerpoint/2010/main">
+    <mc:Choice Requires="p14">
       <p:transition spd="slow" p14:dur="3400">
         <p14:reveal/>
       </p:transition>
     </mc:Choice>
-    <mc:Fallback>
+    <mc:Fallback xmlns="">
       <p:transition spd="slow">
         <p:fade/>
       </p:transition>
@@ -4319,13 +4352,13 @@
   <p:clrMapOvr>
     <a:masterClrMapping/>
   </p:clrMapOvr>
-  <mc:AlternateContent xmlns:mc="http://schemas.openxmlformats.org/markup-compatibility/2006">
-    <mc:Choice xmlns:p14="http://schemas.microsoft.com/office/powerpoint/2010/main" Requires="p14">
+  <mc:AlternateContent xmlns:mc="http://schemas.openxmlformats.org/markup-compatibility/2006" xmlns:p14="http://schemas.microsoft.com/office/powerpoint/2010/main">
+    <mc:Choice Requires="p14">
       <p:transition spd="slow" p14:dur="3400">
         <p14:reveal/>
       </p:transition>
     </mc:Choice>
-    <mc:Fallback>
+    <mc:Fallback xmlns="">
       <p:transition spd="slow">
         <p:fade/>
       </p:transition>
@@ -5242,13 +5275,13 @@
   <p:clrMapOvr>
     <a:masterClrMapping/>
   </p:clrMapOvr>
-  <mc:AlternateContent xmlns:mc="http://schemas.openxmlformats.org/markup-compatibility/2006">
-    <mc:Choice xmlns:p14="http://schemas.microsoft.com/office/powerpoint/2010/main" Requires="p14">
+  <mc:AlternateContent xmlns:mc="http://schemas.openxmlformats.org/markup-compatibility/2006" xmlns:p14="http://schemas.microsoft.com/office/powerpoint/2010/main">
+    <mc:Choice Requires="p14">
       <p:transition spd="slow" p14:dur="3400">
         <p14:reveal/>
       </p:transition>
     </mc:Choice>
-    <mc:Fallback>
+    <mc:Fallback xmlns="">
       <p:transition spd="slow">
         <p:fade/>
       </p:transition>
@@ -6037,13 +6070,13 @@
   <p:clrMapOvr>
     <a:masterClrMapping/>
   </p:clrMapOvr>
-  <mc:AlternateContent xmlns:mc="http://schemas.openxmlformats.org/markup-compatibility/2006">
-    <mc:Choice xmlns:p14="http://schemas.microsoft.com/office/powerpoint/2010/main" Requires="p14">
+  <mc:AlternateContent xmlns:mc="http://schemas.openxmlformats.org/markup-compatibility/2006" xmlns:p14="http://schemas.microsoft.com/office/powerpoint/2010/main">
+    <mc:Choice Requires="p14">
       <p:transition spd="slow" p14:dur="3400">
         <p14:reveal/>
       </p:transition>
     </mc:Choice>
-    <mc:Fallback>
+    <mc:Fallback xmlns="">
       <p:transition spd="slow">
         <p:fade/>
       </p:transition>

</xml_diff>